<commit_message>
November meeting moved to the 15th
Signed-off-by: Nathen Harvey <nharvey@chef.io>
</commit_message>
<xml_diff>
--- a/pdf/DevOpsDC Oct 2016.pptx
+++ b/pdf/DevOpsDC Oct 2016.pptx
@@ -1757,82 +1757,39 @@
               <a:buNone/>
             </a:pPr>
             <a:r>
-              <a:rPr lang="en-US"/>
-              <a:t>September: Laura and Performance Testing in your Pipeline</a:t>
+              <a:rPr lang="en-US" dirty="0" smtClean="0"/>
+              <a:t>We moved the November meeting</a:t>
             </a:r>
-          </a:p>
-          <a:p>
-            <a:pPr marL="0" marR="0" lvl="0" indent="0" algn="l" rtl="0">
-              <a:lnSpc>
-                <a:spcPct val="117999"/>
-              </a:lnSpc>
-              <a:spcBef>
-                <a:spcPts val="0"/>
-              </a:spcBef>
-              <a:buSzPct val="25000"/>
-              <a:buNone/>
-            </a:pPr>
-            <a:endParaRPr/>
-          </a:p>
-          <a:p>
-            <a:pPr marL="0" marR="0" lvl="0" indent="0" algn="l" rtl="0">
-              <a:lnSpc>
-                <a:spcPct val="117999"/>
-              </a:lnSpc>
-              <a:spcBef>
-                <a:spcPts val="0"/>
-              </a:spcBef>
-              <a:buSzPct val="25000"/>
-              <a:buNone/>
-            </a:pPr>
             <a:r>
-              <a:rPr lang="en-US" sz="2200" b="0" i="0" u="none" strike="noStrike" cap="none">
-                <a:latin typeface="Helvetica Neue"/>
-                <a:ea typeface="Helvetica Neue"/>
-                <a:cs typeface="Helvetica Neue"/>
-                <a:sym typeface="Helvetica Neue"/>
-              </a:rPr>
-              <a:t>October:  AppSec USA is in town, our meetup will be walking distance from the conference.</a:t>
+              <a:rPr lang="en-US" baseline="0" dirty="0" smtClean="0"/>
+              <a:t> from the 8</a:t>
             </a:r>
-          </a:p>
-          <a:p>
-            <a:pPr marL="0" marR="0" lvl="0" indent="0" algn="l" rtl="0">
-              <a:lnSpc>
-                <a:spcPct val="117999"/>
-              </a:lnSpc>
-              <a:spcBef>
-                <a:spcPts val="0"/>
-              </a:spcBef>
-              <a:buSzPct val="25000"/>
-              <a:buNone/>
-            </a:pPr>
-            <a:endParaRPr sz="2200" b="0" i="0" u="none" strike="noStrike" cap="none">
+            <a:r>
+              <a:rPr lang="en-US" baseline="30000" dirty="0" smtClean="0"/>
+              <a:t>th</a:t>
+            </a:r>
+            <a:r>
+              <a:rPr lang="en-US" baseline="0" dirty="0" smtClean="0"/>
+              <a:t> to the 15</a:t>
+            </a:r>
+            <a:r>
+              <a:rPr lang="en-US" baseline="30000" dirty="0" smtClean="0"/>
+              <a:t>th</a:t>
+            </a:r>
+            <a:r>
+              <a:rPr lang="en-US" baseline="0" dirty="0" smtClean="0"/>
+              <a:t> because </a:t>
+            </a:r>
+            <a:r>
+              <a:rPr lang="en-US" baseline="0" smtClean="0"/>
+              <a:t>of election day.</a:t>
+            </a:r>
+            <a:endParaRPr lang="en-US" sz="2200" b="0" i="0" u="none" strike="noStrike" cap="none" dirty="0">
               <a:latin typeface="Helvetica Neue"/>
               <a:ea typeface="Helvetica Neue"/>
               <a:cs typeface="Helvetica Neue"/>
               <a:sym typeface="Helvetica Neue"/>
             </a:endParaRPr>
-          </a:p>
-          <a:p>
-            <a:pPr marL="0" marR="0" lvl="0" indent="0" algn="l" rtl="0">
-              <a:lnSpc>
-                <a:spcPct val="117999"/>
-              </a:lnSpc>
-              <a:spcBef>
-                <a:spcPts val="0"/>
-              </a:spcBef>
-              <a:buSzPct val="25000"/>
-              <a:buNone/>
-            </a:pPr>
-            <a:r>
-              <a:rPr lang="en-US" sz="2200" b="0" i="0" u="none" strike="noStrike" cap="none">
-                <a:latin typeface="Helvetica Neue"/>
-                <a:ea typeface="Helvetica Neue"/>
-                <a:cs typeface="Helvetica Neue"/>
-                <a:sym typeface="Helvetica Neue"/>
-              </a:rPr>
-              <a:t>Seeking one other presenter for September, November, and December</a:t>
-            </a:r>
           </a:p>
         </p:txBody>
       </p:sp>
@@ -10683,7 +10640,7 @@
         </p:spPr>
         <p:txBody>
           <a:bodyPr lIns="71425" tIns="71425" rIns="71425" bIns="71425" anchor="t" anchorCtr="0">
-            <a:normAutofit fontScale="77500" lnSpcReduction="20000"/>
+            <a:normAutofit fontScale="70000" lnSpcReduction="20000"/>
           </a:bodyPr>
           <a:lstStyle/>
           <a:p>
@@ -10717,7 +10674,7 @@
               <a:t>November </a:t>
             </a:r>
             <a:r>
-              <a:rPr lang="en-US" sz="8000" b="0" i="0" u="none" strike="noStrike" cap="none" dirty="0">
+              <a:rPr lang="en-US" sz="8000" b="0" i="0" u="none" strike="noStrike" cap="none" dirty="0" smtClean="0">
                 <a:solidFill>
                   <a:srgbClr val="000000"/>
                 </a:solidFill>
@@ -10726,10 +10683,44 @@
                 <a:cs typeface="Gill Sans"/>
                 <a:sym typeface="Arial"/>
               </a:rPr>
-              <a:t>8 - </a:t>
+              <a:t>15 </a:t>
             </a:r>
             <a:r>
-              <a:rPr lang="en-US" sz="8000" b="0" i="0" u="none" strike="noStrike" cap="none" dirty="0" err="1">
+              <a:rPr lang="mr-IN" sz="8000" b="0" i="0" u="none" strike="noStrike" cap="none" dirty="0" smtClean="0">
+                <a:solidFill>
+                  <a:srgbClr val="000000"/>
+                </a:solidFill>
+                <a:latin typeface="Gill Sans"/>
+                <a:ea typeface="Arial"/>
+                <a:cs typeface="Gill Sans"/>
+                <a:sym typeface="Arial"/>
+              </a:rPr>
+              <a:t>–</a:t>
+            </a:r>
+            <a:r>
+              <a:rPr lang="en-US" sz="8000" b="0" i="0" u="none" strike="noStrike" cap="none" dirty="0" smtClean="0">
+                <a:solidFill>
+                  <a:srgbClr val="000000"/>
+                </a:solidFill>
+                <a:latin typeface="Gill Sans"/>
+                <a:ea typeface="Arial"/>
+                <a:cs typeface="Gill Sans"/>
+                <a:sym typeface="Arial"/>
+              </a:rPr>
+              <a:t> </a:t>
+            </a:r>
+          </a:p>
+          <a:p>
+            <a:pPr lvl="1" indent="-617361"/>
+            <a:r>
+              <a:rPr lang="en-US" sz="8000" dirty="0" smtClean="0">
+                <a:latin typeface="Gill Sans"/>
+                <a:cs typeface="Gill Sans"/>
+              </a:rPr>
+              <a:t>Location:  </a:t>
+            </a:r>
+            <a:r>
+              <a:rPr lang="en-US" sz="8000" b="0" i="0" u="none" strike="noStrike" cap="none" dirty="0" err="1" smtClean="0">
                 <a:solidFill>
                   <a:srgbClr val="000000"/>
                 </a:solidFill>
@@ -10741,7 +10732,7 @@
               <a:t>Excella</a:t>
             </a:r>
             <a:r>
-              <a:rPr lang="en-US" sz="8000" b="0" i="0" u="none" strike="noStrike" cap="none" dirty="0">
+              <a:rPr lang="en-US" sz="8000" b="0" i="0" u="none" strike="noStrike" cap="none" dirty="0" smtClean="0">
                 <a:solidFill>
                   <a:srgbClr val="000000"/>
                 </a:solidFill>
@@ -10750,10 +10741,29 @@
                 <a:cs typeface="Gill Sans"/>
                 <a:sym typeface="Arial"/>
               </a:rPr>
-              <a:t> Consulting, Tony </a:t>
+              <a:t> Consulting</a:t>
+            </a:r>
+            <a:endParaRPr lang="en-US" sz="8000" dirty="0">
+              <a:latin typeface="Gill Sans"/>
+              <a:cs typeface="Gill Sans"/>
+            </a:endParaRPr>
+          </a:p>
+          <a:p>
+            <a:pPr lvl="1" indent="-617361"/>
+            <a:r>
+              <a:rPr lang="en-US" sz="8000" b="0" i="0" u="none" strike="noStrike" cap="none" dirty="0" err="1" smtClean="0">
+                <a:solidFill>
+                  <a:srgbClr val="000000"/>
+                </a:solidFill>
+                <a:latin typeface="Gill Sans"/>
+                <a:ea typeface="Arial"/>
+                <a:cs typeface="Gill Sans"/>
+                <a:sym typeface="Arial"/>
+              </a:rPr>
+              <a:t>DevOps</a:t>
             </a:r>
             <a:r>
-              <a:rPr lang="en-US" sz="8000" b="0" i="0" u="none" strike="noStrike" cap="none" dirty="0" err="1">
+              <a:rPr lang="en-US" sz="8000" b="0" i="0" u="none" strike="noStrike" cap="none" dirty="0" smtClean="0">
                 <a:solidFill>
                   <a:srgbClr val="000000"/>
                 </a:solidFill>
@@ -10762,20 +10772,11 @@
                 <a:cs typeface="Gill Sans"/>
                 <a:sym typeface="Arial"/>
               </a:rPr>
-              <a:t>Alletag</a:t>
+              <a:t> &amp; Government Contracts</a:t>
             </a:r>
-            <a:r>
-              <a:rPr lang="en-US" sz="8000" b="0" i="0" u="none" strike="noStrike" cap="none" dirty="0">
-                <a:solidFill>
-                  <a:srgbClr val="000000"/>
-                </a:solidFill>
-                <a:latin typeface="Gill Sans"/>
-                <a:ea typeface="Arial"/>
-                <a:cs typeface="Gill Sans"/>
-                <a:sym typeface="Arial"/>
-              </a:rPr>
-              <a:t> &amp; </a:t>
-            </a:r>
+          </a:p>
+          <a:p>
+            <a:pPr lvl="1" indent="-617361"/>
             <a:r>
               <a:rPr lang="en-US" sz="8000" dirty="0" err="1" smtClean="0">
                 <a:latin typeface="Gill Sans"/>
@@ -10803,95 +10804,46 @@
             </a:endParaRPr>
           </a:p>
           <a:p>
-            <a:pPr lvl="1" indent="-617361"/>
+            <a:pPr marL="617361" marR="0" lvl="0" indent="-617361" algn="l" rtl="0">
+              <a:lnSpc>
+                <a:spcPct val="100000"/>
+              </a:lnSpc>
+              <a:spcBef>
+                <a:spcPts val="5900"/>
+              </a:spcBef>
+              <a:spcAft>
+                <a:spcPts val="0"/>
+              </a:spcAft>
+              <a:buClr>
+                <a:srgbClr val="000000"/>
+              </a:buClr>
+              <a:buSzPct val="75000"/>
+              <a:buFont typeface="Arial"/>
+              <a:buChar char="•"/>
+            </a:pPr>
             <a:r>
-              <a:rPr lang="en-US" sz="8000" dirty="0" smtClean="0">
+              <a:rPr lang="en-US" sz="8000" b="0" i="0" u="none" strike="noStrike" cap="none" dirty="0" smtClean="0">
+                <a:solidFill>
+                  <a:srgbClr val="000000"/>
+                </a:solidFill>
                 <a:latin typeface="Gill Sans"/>
+                <a:ea typeface="Arial"/>
                 <a:cs typeface="Gill Sans"/>
+                <a:sym typeface="Arial"/>
               </a:rPr>
-              <a:t>Wait</a:t>
+              <a:t>December </a:t>
             </a:r>
             <a:r>
-              <a:rPr lang="mr-IN" sz="8000" dirty="0" smtClean="0">
+              <a:rPr lang="en-US" sz="8000" b="0" i="0" u="none" strike="noStrike" cap="none" dirty="0">
+                <a:solidFill>
+                  <a:srgbClr val="000000"/>
+                </a:solidFill>
                 <a:latin typeface="Gill Sans"/>
+                <a:ea typeface="Arial"/>
                 <a:cs typeface="Gill Sans"/>
+                <a:sym typeface="Arial"/>
               </a:rPr>
-              <a:t>…</a:t>
-            </a:r>
-            <a:r>
-              <a:rPr lang="en-US" sz="8000" dirty="0" smtClean="0">
-                <a:latin typeface="Gill Sans"/>
-                <a:cs typeface="Gill Sans"/>
-              </a:rPr>
-              <a:t>I think there’s something else happening on Nov 8.  Maybe more important than a </a:t>
-            </a:r>
-            <a:r>
-              <a:rPr lang="en-US" sz="8000" dirty="0" err="1" smtClean="0">
-                <a:latin typeface="Gill Sans"/>
-                <a:cs typeface="Gill Sans"/>
-              </a:rPr>
-              <a:t>meetup</a:t>
-            </a:r>
-            <a:r>
-              <a:rPr lang="en-US" sz="8000" dirty="0" smtClean="0">
-                <a:latin typeface="Gill Sans"/>
-                <a:cs typeface="Gill Sans"/>
-              </a:rPr>
-              <a:t>?  We are looking to reschedule to November 15</a:t>
-            </a:r>
-            <a:r>
-              <a:rPr lang="mr-IN" sz="8000" dirty="0" smtClean="0">
-                <a:latin typeface="Gill Sans"/>
-                <a:cs typeface="Gill Sans"/>
-              </a:rPr>
-              <a:t>…</a:t>
-            </a:r>
-            <a:r>
-              <a:rPr lang="en-US" sz="8000" dirty="0" smtClean="0">
-                <a:latin typeface="Gill Sans"/>
-                <a:cs typeface="Gill Sans"/>
-              </a:rPr>
-              <a:t>stay tuned</a:t>
-            </a:r>
-            <a:endParaRPr lang="en-US" sz="8000" b="0" i="0" u="none" strike="noStrike" cap="none" dirty="0">
-              <a:solidFill>
-                <a:srgbClr val="000000"/>
-              </a:solidFill>
-              <a:latin typeface="Gill Sans"/>
-              <a:ea typeface="Arial"/>
-              <a:cs typeface="Gill Sans"/>
-              <a:sym typeface="Arial"/>
-            </a:endParaRPr>
-          </a:p>
-          <a:p>
-            <a:pPr marL="617361" marR="0" lvl="0" indent="-617361" algn="l" rtl="0">
-              <a:lnSpc>
-                <a:spcPct val="100000"/>
-              </a:lnSpc>
-              <a:spcBef>
-                <a:spcPts val="5900"/>
-              </a:spcBef>
-              <a:spcAft>
-                <a:spcPts val="0"/>
-              </a:spcAft>
-              <a:buClr>
-                <a:srgbClr val="000000"/>
-              </a:buClr>
-              <a:buSzPct val="75000"/>
-              <a:buFont typeface="Arial"/>
-              <a:buChar char="•"/>
-            </a:pPr>
-            <a:r>
-              <a:rPr lang="en-US" sz="8000" b="0" i="0" u="none" strike="noStrike" cap="none" dirty="0">
-                <a:solidFill>
-                  <a:srgbClr val="000000"/>
-                </a:solidFill>
-                <a:latin typeface="Gill Sans"/>
-                <a:ea typeface="Arial"/>
-                <a:cs typeface="Gill Sans"/>
-                <a:sym typeface="Arial"/>
-              </a:rPr>
-              <a:t>December 13 - </a:t>
+              <a:t>13 - </a:t>
             </a:r>
             <a:r>
               <a:rPr lang="en-US" sz="8000" b="0" i="0" u="none" strike="noStrike" cap="none" dirty="0" err="1">
@@ -12594,14 +12546,7 @@
                 <a:latin typeface="Gill Sans"/>
                 <a:cs typeface="Gill Sans"/>
               </a:rPr>
-              <a:t>Philly </a:t>
-            </a:r>
-            <a:r>
-              <a:rPr lang="en-US" sz="6600" dirty="0" smtClean="0">
-                <a:latin typeface="Gill Sans"/>
-                <a:cs typeface="Gill Sans"/>
-              </a:rPr>
-              <a:t>– 26-27 Oct</a:t>
+              <a:t>Philly – 26-27 Oct</a:t>
             </a:r>
           </a:p>
           <a:p>

</xml_diff>

<commit_message>
Sponsors for October are set
Signed-off-by: Nathen Harvey <nharvey@chef.io>
</commit_message>
<xml_diff>
--- a/pdf/DevOpsDC Oct 2016.pptx
+++ b/pdf/DevOpsDC Oct 2016.pptx
@@ -881,9 +881,62 @@
               <a:buNone/>
             </a:pPr>
             <a:r>
-              <a:rPr lang="en-US"/>
-              <a:t>Let’s hear from our sponsors</a:t>
+              <a:rPr lang="en-US" dirty="0" err="1" smtClean="0"/>
+              <a:t>Optoro</a:t>
             </a:r>
+            <a:r>
+              <a:rPr lang="en-US" dirty="0" smtClean="0"/>
+              <a:t> </a:t>
+            </a:r>
+            <a:r>
+              <a:rPr lang="mr-IN" dirty="0" smtClean="0"/>
+              <a:t>–</a:t>
+            </a:r>
+            <a:r>
+              <a:rPr lang="en-US" dirty="0" smtClean="0"/>
+              <a:t> location</a:t>
+            </a:r>
+          </a:p>
+          <a:p>
+            <a:pPr lvl="0">
+              <a:spcBef>
+                <a:spcPts val="0"/>
+              </a:spcBef>
+              <a:buNone/>
+            </a:pPr>
+            <a:r>
+              <a:rPr lang="en-US" dirty="0" smtClean="0"/>
+              <a:t>Fugue </a:t>
+            </a:r>
+            <a:r>
+              <a:rPr lang="mr-IN" dirty="0" smtClean="0"/>
+              <a:t>–</a:t>
+            </a:r>
+            <a:r>
+              <a:rPr lang="en-US" dirty="0" smtClean="0"/>
+              <a:t> Food</a:t>
+            </a:r>
+          </a:p>
+          <a:p>
+            <a:pPr lvl="0">
+              <a:spcBef>
+                <a:spcPts val="0"/>
+              </a:spcBef>
+              <a:buNone/>
+            </a:pPr>
+            <a:r>
+              <a:rPr lang="en-US" dirty="0" smtClean="0"/>
+              <a:t>Riverbed</a:t>
+            </a:r>
+            <a:r>
+              <a:rPr lang="en-US" baseline="0" dirty="0" smtClean="0"/>
+              <a:t> </a:t>
+            </a:r>
+            <a:r>
+              <a:rPr lang="en-US" baseline="0" smtClean="0"/>
+              <a:t>- drinks</a:t>
+            </a:r>
+            <a:endParaRPr lang="en-US" dirty="0"/>
           </a:p>
         </p:txBody>
       </p:sp>
@@ -10671,19 +10724,7 @@
                 <a:cs typeface="Gill Sans"/>
                 <a:sym typeface="Arial"/>
               </a:rPr>
-              <a:t>November </a:t>
-            </a:r>
-            <a:r>
-              <a:rPr lang="en-US" sz="8000" b="0" i="0" u="none" strike="noStrike" cap="none" dirty="0" smtClean="0">
-                <a:solidFill>
-                  <a:srgbClr val="000000"/>
-                </a:solidFill>
-                <a:latin typeface="Gill Sans"/>
-                <a:ea typeface="Arial"/>
-                <a:cs typeface="Gill Sans"/>
-                <a:sym typeface="Arial"/>
-              </a:rPr>
-              <a:t>15 </a:t>
+              <a:t>November 15 </a:t>
             </a:r>
             <a:r>
               <a:rPr lang="mr-IN" sz="8000" b="0" i="0" u="none" strike="noStrike" cap="none" dirty="0" smtClean="0">
@@ -11227,36 +11268,6 @@
           <a:chExt cx="0" cy="0"/>
         </a:xfrm>
       </p:grpSpPr>
-      <p:pic>
-        <p:nvPicPr>
-          <p:cNvPr id="4" name="Picture 3" descr="optoro_400x400.jpg"/>
-          <p:cNvPicPr>
-            <a:picLocks noChangeAspect="1"/>
-          </p:cNvPicPr>
-          <p:nvPr/>
-        </p:nvPicPr>
-        <p:blipFill>
-          <a:blip r:embed="rId3">
-            <a:extLst>
-              <a:ext uri="{28A0092B-C50C-407E-A947-70E740481C1C}">
-                <a14:useLocalDpi xmlns:a14="http://schemas.microsoft.com/office/drawing/2010/main" val="0"/>
-              </a:ext>
-            </a:extLst>
-          </a:blip>
-          <a:stretch>
-            <a:fillRect/>
-          </a:stretch>
-        </p:blipFill>
-        <p:spPr>
-          <a:xfrm>
-            <a:off x="9652000" y="4318000"/>
-            <a:ext cx="5080000" cy="5080000"/>
-          </a:xfrm>
-          <a:prstGeom prst="rect">
-            <a:avLst/>
-          </a:prstGeom>
-        </p:spPr>
-      </p:pic>
       <p:sp>
         <p:nvSpPr>
           <p:cNvPr id="76" name="Shape 76"/>
@@ -11318,6 +11329,111 @@
           </a:p>
         </p:txBody>
       </p:sp>
+      <p:grpSp>
+        <p:nvGrpSpPr>
+          <p:cNvPr id="6" name="Group 5"/>
+          <p:cNvGrpSpPr/>
+          <p:nvPr/>
+        </p:nvGrpSpPr>
+        <p:grpSpPr>
+          <a:xfrm>
+            <a:off x="7184920" y="4318000"/>
+            <a:ext cx="10014161" cy="5895498"/>
+            <a:chOff x="7164158" y="4318000"/>
+            <a:chExt cx="10014161" cy="5895498"/>
+          </a:xfrm>
+        </p:grpSpPr>
+        <p:pic>
+          <p:nvPicPr>
+            <p:cNvPr id="4" name="Picture 3" descr="optoro_400x400.jpg"/>
+            <p:cNvPicPr>
+              <a:picLocks noChangeAspect="1"/>
+            </p:cNvPicPr>
+            <p:nvPr/>
+          </p:nvPicPr>
+          <p:blipFill>
+            <a:blip r:embed="rId3">
+              <a:extLst>
+                <a:ext uri="{28A0092B-C50C-407E-A947-70E740481C1C}">
+                  <a14:useLocalDpi xmlns:a14="http://schemas.microsoft.com/office/drawing/2010/main" val="0"/>
+                </a:ext>
+              </a:extLst>
+            </a:blip>
+            <a:stretch>
+              <a:fillRect/>
+            </a:stretch>
+          </p:blipFill>
+          <p:spPr>
+            <a:xfrm>
+              <a:off x="10718126" y="4318000"/>
+              <a:ext cx="2947749" cy="2947749"/>
+            </a:xfrm>
+            <a:prstGeom prst="rect">
+              <a:avLst/>
+            </a:prstGeom>
+          </p:spPr>
+        </p:pic>
+        <p:pic>
+          <p:nvPicPr>
+            <p:cNvPr id="2" name="Picture 1" descr="Fugue Logotype.png"/>
+            <p:cNvPicPr>
+              <a:picLocks noChangeAspect="1"/>
+            </p:cNvPicPr>
+            <p:nvPr/>
+          </p:nvPicPr>
+          <p:blipFill>
+            <a:blip r:embed="rId4">
+              <a:extLst>
+                <a:ext uri="{28A0092B-C50C-407E-A947-70E740481C1C}">
+                  <a14:useLocalDpi xmlns:a14="http://schemas.microsoft.com/office/drawing/2010/main" val="0"/>
+                </a:ext>
+              </a:extLst>
+            </a:blip>
+            <a:stretch>
+              <a:fillRect/>
+            </a:stretch>
+          </p:blipFill>
+          <p:spPr>
+            <a:xfrm>
+              <a:off x="7164158" y="7265749"/>
+              <a:ext cx="3553968" cy="2039112"/>
+            </a:xfrm>
+            <a:prstGeom prst="rect">
+              <a:avLst/>
+            </a:prstGeom>
+          </p:spPr>
+        </p:pic>
+        <p:pic>
+          <p:nvPicPr>
+            <p:cNvPr id="5" name="Picture 4" descr="riverbed.png"/>
+            <p:cNvPicPr>
+              <a:picLocks noChangeAspect="1"/>
+            </p:cNvPicPr>
+            <p:nvPr/>
+          </p:nvPicPr>
+          <p:blipFill>
+            <a:blip r:embed="rId5">
+              <a:extLst>
+                <a:ext uri="{28A0092B-C50C-407E-A947-70E740481C1C}">
+                  <a14:useLocalDpi xmlns:a14="http://schemas.microsoft.com/office/drawing/2010/main" val="0"/>
+                </a:ext>
+              </a:extLst>
+            </a:blip>
+            <a:stretch>
+              <a:fillRect/>
+            </a:stretch>
+          </p:blipFill>
+          <p:spPr>
+            <a:xfrm>
+              <a:off x="14230570" y="7265749"/>
+              <a:ext cx="2947749" cy="2947749"/>
+            </a:xfrm>
+            <a:prstGeom prst="rect">
+              <a:avLst/>
+            </a:prstGeom>
+          </p:spPr>
+        </p:pic>
+      </p:grpSp>
     </p:spTree>
   </p:cSld>
   <p:clrMapOvr>

</xml_diff>